<commit_message>
Slide do Sprint da semana
</commit_message>
<xml_diff>
--- a/Sprints/Sprint_003 da equipe.pptx
+++ b/Sprints/Sprint_003 da equipe.pptx
@@ -7,13 +7,11 @@
   <p:sldIdLst>
     <p:sldId id="256" r:id="rId2"/>
     <p:sldId id="260" r:id="rId3"/>
-    <p:sldId id="279" r:id="rId4"/>
-    <p:sldId id="283" r:id="rId5"/>
-    <p:sldId id="281" r:id="rId6"/>
-    <p:sldId id="270" r:id="rId7"/>
-    <p:sldId id="261" r:id="rId8"/>
-    <p:sldId id="280" r:id="rId9"/>
-    <p:sldId id="282" r:id="rId10"/>
+    <p:sldId id="280" r:id="rId4"/>
+    <p:sldId id="282" r:id="rId5"/>
+    <p:sldId id="283" r:id="rId6"/>
+    <p:sldId id="261" r:id="rId7"/>
+    <p:sldId id="284" r:id="rId8"/>
   </p:sldIdLst>
   <p:sldSz cx="12192000" cy="6858000"/>
   <p:notesSz cx="6858000" cy="9144000"/>
@@ -3413,7 +3411,7 @@
             </a:br>
             <a:r>
               <a:rPr lang="pt-BR" dirty="0"/>
-              <a:t>17/09/2018</a:t>
+              <a:t>24/09/2018</a:t>
             </a:r>
           </a:p>
         </p:txBody>
@@ -3702,8 +3700,13 @@
             </a:r>
             <a:r>
               <a:rPr lang="pt-BR" dirty="0"/>
-              <a:t>Elaboração do diagrama de classes do sistema de estoques de uma farmácia</a:t>
-            </a:r>
+              <a:t>Implementação das superclasses.</a:t>
+            </a:r>
+            <a:endParaRPr lang="pt-BR" sz="1400" dirty="0">
+              <a:latin typeface="Calibri" panose="020F0502020204030204" pitchFamily="34" charset="0"/>
+              <a:ea typeface="Calibri" panose="020F0502020204030204" pitchFamily="34" charset="0"/>
+              <a:cs typeface="Times New Roman" panose="02020603050405020304" pitchFamily="18" charset="0"/>
+            </a:endParaRPr>
           </a:p>
           <a:p>
             <a:pPr algn="just"/>
@@ -3713,26 +3716,30 @@
             </a:r>
             <a:r>
               <a:rPr lang="pt-BR" dirty="0"/>
-              <a:t>:  O diagrama de classes será elaborado para a apresentação e para que haja uma base de como funcionará o software, mostrando suas funcionalidades.</a:t>
-            </a:r>
-          </a:p>
-          <a:p>
-            <a:pPr algn="just"/>
+              <a:t>: Iniciar a implementação/codificação da superclasse principal do projeto.</a:t>
+            </a:r>
+          </a:p>
+          <a:p>
             <a:r>
               <a:rPr lang="pt-BR" b="1" dirty="0"/>
-              <a:t>Status: [Concluído]</a:t>
+              <a:t>Status: </a:t>
             </a:r>
             <a:r>
               <a:rPr lang="pt-BR" dirty="0"/>
-              <a:t>.</a:t>
-            </a:r>
+              <a:t>[Em andamento].</a:t>
+            </a:r>
+            <a:endParaRPr lang="pt-BR" dirty="0">
+              <a:latin typeface="Calibri" panose="020F0502020204030204" pitchFamily="34" charset="0"/>
+              <a:ea typeface="Calibri" panose="020F0502020204030204" pitchFamily="34" charset="0"/>
+              <a:cs typeface="Times New Roman" panose="02020603050405020304" pitchFamily="18" charset="0"/>
+            </a:endParaRPr>
           </a:p>
         </p:txBody>
       </p:sp>
     </p:spTree>
     <p:extLst>
       <p:ext uri="{BB962C8B-B14F-4D97-AF65-F5344CB8AC3E}">
-        <p14:creationId xmlns:p14="http://schemas.microsoft.com/office/powerpoint/2010/main" val="3608090763"/>
+        <p14:creationId xmlns:p14="http://schemas.microsoft.com/office/powerpoint/2010/main" val="398285591"/>
       </p:ext>
     </p:extLst>
   </p:cSld>
@@ -3771,40 +3778,90 @@
           <a:chExt cx="0" cy="0"/>
         </a:xfrm>
       </p:grpSpPr>
-      <p:pic>
-        <p:nvPicPr>
-          <p:cNvPr id="3" name="Imagem 2">
+      <p:sp>
+        <p:nvSpPr>
+          <p:cNvPr id="2" name="Título 1">
             <a:extLst>
               <a:ext uri="{FF2B5EF4-FFF2-40B4-BE49-F238E27FC236}">
-                <a16:creationId xmlns:a16="http://schemas.microsoft.com/office/drawing/2014/main" id="{689A2362-A10B-473B-87D3-D078C4CF5ADF}"/>
+                <a16:creationId xmlns:a16="http://schemas.microsoft.com/office/drawing/2014/main" id="{3955ABDF-B885-EB4D-A036-E088DD1787E3}"/>
               </a:ext>
             </a:extLst>
           </p:cNvPr>
-          <p:cNvPicPr>
-            <a:picLocks noChangeAspect="1"/>
-          </p:cNvPicPr>
-          <p:nvPr/>
-        </p:nvPicPr>
-        <p:blipFill>
-          <a:blip r:embed="rId2"/>
-          <a:stretch>
-            <a:fillRect/>
-          </a:stretch>
-        </p:blipFill>
-        <p:spPr>
-          <a:xfrm>
-            <a:off x="-58449" y="327546"/>
-            <a:ext cx="12308898" cy="6202909"/>
-          </a:xfrm>
-          <a:prstGeom prst="rect">
-            <a:avLst/>
-          </a:prstGeom>
-        </p:spPr>
-      </p:pic>
+          <p:cNvSpPr>
+            <a:spLocks noGrp="1"/>
+          </p:cNvSpPr>
+          <p:nvPr>
+            <p:ph type="title"/>
+          </p:nvPr>
+        </p:nvSpPr>
+        <p:spPr/>
+        <p:txBody>
+          <a:bodyPr/>
+          <a:lstStyle/>
+          <a:p>
+            <a:r>
+              <a:rPr lang="pt-BR"/>
+              <a:t>2ª Estória </a:t>
+            </a:r>
+          </a:p>
+        </p:txBody>
+      </p:sp>
+      <p:sp>
+        <p:nvSpPr>
+          <p:cNvPr id="3" name="Espaço Reservado para Conteúdo 2">
+            <a:extLst>
+              <a:ext uri="{FF2B5EF4-FFF2-40B4-BE49-F238E27FC236}">
+                <a16:creationId xmlns:a16="http://schemas.microsoft.com/office/drawing/2014/main" id="{784B08D6-3AD7-4B47-A8C0-6F77058163DA}"/>
+              </a:ext>
+            </a:extLst>
+          </p:cNvPr>
+          <p:cNvSpPr>
+            <a:spLocks noGrp="1"/>
+          </p:cNvSpPr>
+          <p:nvPr>
+            <p:ph idx="1"/>
+          </p:nvPr>
+        </p:nvSpPr>
+        <p:spPr/>
+        <p:txBody>
+          <a:bodyPr/>
+          <a:lstStyle/>
+          <a:p>
+            <a:r>
+              <a:rPr lang="pt-BR" b="1" dirty="0"/>
+              <a:t>2ª Estória</a:t>
+            </a:r>
+            <a:r>
+              <a:rPr lang="pt-BR" dirty="0"/>
+              <a:t>: Depuração do Software </a:t>
+            </a:r>
+          </a:p>
+          <a:p>
+            <a:r>
+              <a:rPr lang="pt-BR" b="1" dirty="0"/>
+              <a:t>Descrição</a:t>
+            </a:r>
+            <a:r>
+              <a:rPr lang="pt-BR" dirty="0"/>
+              <a:t>: Verificando as classes e seus atributos para ter certeza se tudo é necessário ou não. </a:t>
+            </a:r>
+          </a:p>
+          <a:p>
+            <a:r>
+              <a:rPr lang="pt-BR" b="1" dirty="0"/>
+              <a:t>Status</a:t>
+            </a:r>
+            <a:r>
+              <a:rPr lang="pt-BR" dirty="0"/>
+              <a:t>: [Em andamento].</a:t>
+            </a:r>
+          </a:p>
+        </p:txBody>
+      </p:sp>
     </p:spTree>
     <p:extLst>
       <p:ext uri="{BB962C8B-B14F-4D97-AF65-F5344CB8AC3E}">
-        <p14:creationId xmlns:p14="http://schemas.microsoft.com/office/powerpoint/2010/main" val="3277345281"/>
+        <p14:creationId xmlns:p14="http://schemas.microsoft.com/office/powerpoint/2010/main" val="1391589051"/>
       </p:ext>
     </p:extLst>
   </p:cSld>
@@ -3833,7 +3890,13 @@
       </p:grpSpPr>
       <p:sp>
         <p:nvSpPr>
-          <p:cNvPr id="2" name="Título 1"/>
+          <p:cNvPr id="2" name="Título 1">
+            <a:extLst>
+              <a:ext uri="{FF2B5EF4-FFF2-40B4-BE49-F238E27FC236}">
+                <a16:creationId xmlns:a16="http://schemas.microsoft.com/office/drawing/2014/main" id="{3955ABDF-B885-EB4D-A036-E088DD1787E3}"/>
+              </a:ext>
+            </a:extLst>
+          </p:cNvPr>
           <p:cNvSpPr>
             <a:spLocks noGrp="1"/>
           </p:cNvSpPr>
@@ -3848,14 +3911,20 @@
           <a:p>
             <a:r>
               <a:rPr lang="pt-BR" dirty="0"/>
-              <a:t>2ª Estória</a:t>
-            </a:r>
-          </a:p>
-        </p:txBody>
-      </p:sp>
-      <p:sp>
-        <p:nvSpPr>
-          <p:cNvPr id="3" name="Espaço Reservado para Conteúdo 2"/>
+              <a:t>3ª Estória </a:t>
+            </a:r>
+          </a:p>
+        </p:txBody>
+      </p:sp>
+      <p:sp>
+        <p:nvSpPr>
+          <p:cNvPr id="3" name="Espaço Reservado para Conteúdo 2">
+            <a:extLst>
+              <a:ext uri="{FF2B5EF4-FFF2-40B4-BE49-F238E27FC236}">
+                <a16:creationId xmlns:a16="http://schemas.microsoft.com/office/drawing/2014/main" id="{784B08D6-3AD7-4B47-A8C0-6F77058163DA}"/>
+              </a:ext>
+            </a:extLst>
+          </p:cNvPr>
           <p:cNvSpPr>
             <a:spLocks noGrp="1"/>
           </p:cNvSpPr>
@@ -3863,46 +3932,54 @@
             <p:ph idx="1"/>
           </p:nvPr>
         </p:nvSpPr>
-        <p:spPr>
-          <a:xfrm>
-            <a:off x="3869268" y="864108"/>
-            <a:ext cx="7490710" cy="5120640"/>
-          </a:xfrm>
-        </p:spPr>
-        <p:txBody>
-          <a:bodyPr/>
-          <a:lstStyle/>
-          <a:p>
-            <a:pPr algn="just"/>
+        <p:spPr/>
+        <p:txBody>
+          <a:bodyPr/>
+          <a:lstStyle/>
+          <a:p>
             <a:r>
               <a:rPr lang="pt-BR" b="1" dirty="0"/>
-              <a:t>2ª Estória: </a:t>
+              <a:t>3ª Estória</a:t>
             </a:r>
             <a:r>
               <a:rPr lang="pt-BR" dirty="0"/>
-              <a:t>Elaboração da descrição detalhada do sistema, explicando seus requisitos funcionais e não funcionais.</a:t>
-            </a:r>
-          </a:p>
-          <a:p>
-            <a:pPr algn="just"/>
+              <a:t>: Implementação da interface </a:t>
+            </a:r>
+          </a:p>
+          <a:p>
             <a:r>
               <a:rPr lang="pt-BR" b="1" dirty="0"/>
               <a:t>Descrição</a:t>
             </a:r>
             <a:r>
               <a:rPr lang="pt-BR" dirty="0"/>
-              <a:t>: A descrição do sistema será entregue conforme a data prevista com todos os dados dos requisitos do sistema e com o diagrama de classes.</a:t>
-            </a:r>
-          </a:p>
-          <a:p>
-            <a:pPr algn="just"/>
+              <a:t>: Implementação da interface por meio do </a:t>
+            </a:r>
+            <a:r>
+              <a:rPr lang="pt-BR" dirty="0" err="1"/>
+              <a:t>java.swing</a:t>
+            </a:r>
+            <a:r>
+              <a:rPr lang="pt-BR" dirty="0"/>
+              <a:t> no </a:t>
+            </a:r>
+            <a:r>
+              <a:rPr lang="pt-BR" dirty="0" err="1"/>
+              <a:t>netBeans</a:t>
+            </a:r>
+            <a:r>
+              <a:rPr lang="pt-BR" dirty="0"/>
+              <a:t>. </a:t>
+            </a:r>
+          </a:p>
+          <a:p>
             <a:r>
               <a:rPr lang="pt-BR" b="1" dirty="0"/>
-              <a:t>Status: [Concluído]</a:t>
+              <a:t>Status</a:t>
             </a:r>
             <a:r>
               <a:rPr lang="pt-BR" dirty="0"/>
-              <a:t>.</a:t>
+              <a:t>: [Em andamento].</a:t>
             </a:r>
           </a:p>
         </p:txBody>
@@ -3910,25 +3987,13 @@
     </p:spTree>
     <p:extLst>
       <p:ext uri="{BB962C8B-B14F-4D97-AF65-F5344CB8AC3E}">
-        <p14:creationId xmlns:p14="http://schemas.microsoft.com/office/powerpoint/2010/main" val="1396510283"/>
+        <p14:creationId xmlns:p14="http://schemas.microsoft.com/office/powerpoint/2010/main" val="1935292475"/>
       </p:ext>
     </p:extLst>
   </p:cSld>
   <p:clrMapOvr>
     <a:masterClrMapping/>
   </p:clrMapOvr>
-  <mc:AlternateContent xmlns:mc="http://schemas.openxmlformats.org/markup-compatibility/2006" xmlns:p14="http://schemas.microsoft.com/office/powerpoint/2010/main">
-    <mc:Choice Requires="p14">
-      <p:transition spd="slow" p14:dur="1300">
-        <p14:pan dir="u"/>
-      </p:transition>
-    </mc:Choice>
-    <mc:Fallback xmlns="">
-      <p:transition spd="slow">
-        <p:fade/>
-      </p:transition>
-    </mc:Fallback>
-  </mc:AlternateContent>
 </p:sld>
 </file>
 
@@ -3951,7 +4016,7 @@
       </p:grpSpPr>
       <p:sp>
         <p:nvSpPr>
-          <p:cNvPr id="2" name="Título 1"/>
+          <p:cNvPr id="12" name="Título 11"/>
           <p:cNvSpPr>
             <a:spLocks noGrp="1"/>
           </p:cNvSpPr>
@@ -3966,69 +4031,34 @@
           <a:p>
             <a:r>
               <a:rPr lang="pt-BR" dirty="0"/>
-              <a:t>3ª Estória</a:t>
-            </a:r>
-          </a:p>
-        </p:txBody>
-      </p:sp>
-      <p:sp>
-        <p:nvSpPr>
-          <p:cNvPr id="3" name="Espaço Reservado para Conteúdo 2"/>
-          <p:cNvSpPr>
-            <a:spLocks noGrp="1"/>
-          </p:cNvSpPr>
-          <p:nvPr>
-            <p:ph idx="1"/>
-          </p:nvPr>
-        </p:nvSpPr>
-        <p:spPr>
-          <a:xfrm>
-            <a:off x="3869268" y="864108"/>
-            <a:ext cx="7490710" cy="5120640"/>
-          </a:xfrm>
-        </p:spPr>
-        <p:txBody>
-          <a:bodyPr/>
-          <a:lstStyle/>
-          <a:p>
-            <a:pPr algn="just"/>
-            <a:r>
-              <a:rPr lang="pt-BR" b="1" dirty="0"/>
-              <a:t>3ª Estória: </a:t>
-            </a:r>
-            <a:r>
-              <a:rPr lang="pt-BR" dirty="0"/>
-              <a:t>Pesquisar a implementação do Banco de Dados e da Interface Gráfica.</a:t>
-            </a:r>
-          </a:p>
-          <a:p>
-            <a:pPr algn="just"/>
-            <a:r>
-              <a:rPr lang="pt-BR" b="1" dirty="0"/>
-              <a:t>Descrição</a:t>
-            </a:r>
-            <a:r>
-              <a:rPr lang="pt-BR" dirty="0"/>
-              <a:t>:   Entender como implementar um Banco de Dados e como juntar a interface aos scripts.</a:t>
-            </a:r>
-          </a:p>
-          <a:p>
-            <a:pPr algn="just"/>
-            <a:r>
-              <a:rPr lang="pt-BR" b="1" dirty="0"/>
-              <a:t>Status: [Em andamento]</a:t>
-            </a:r>
-            <a:r>
-              <a:rPr lang="pt-BR" dirty="0"/>
-              <a:t>.</a:t>
-            </a:r>
+              <a:t>Estórias do Próximo Sprint</a:t>
+            </a:r>
+          </a:p>
+        </p:txBody>
+      </p:sp>
+      <p:sp>
+        <p:nvSpPr>
+          <p:cNvPr id="13" name="Espaço Reservado para Texto 12"/>
+          <p:cNvSpPr>
+            <a:spLocks noGrp="1"/>
+          </p:cNvSpPr>
+          <p:nvPr>
+            <p:ph type="body" idx="1"/>
+          </p:nvPr>
+        </p:nvSpPr>
+        <p:spPr/>
+        <p:txBody>
+          <a:bodyPr/>
+          <a:lstStyle/>
+          <a:p>
+            <a:endParaRPr lang="pt-BR" dirty="0"/>
           </a:p>
         </p:txBody>
       </p:sp>
     </p:spTree>
     <p:extLst>
       <p:ext uri="{BB962C8B-B14F-4D97-AF65-F5344CB8AC3E}">
-        <p14:creationId xmlns:p14="http://schemas.microsoft.com/office/powerpoint/2010/main" val="774972579"/>
+        <p14:creationId xmlns:p14="http://schemas.microsoft.com/office/powerpoint/2010/main" val="503902318"/>
       </p:ext>
     </p:extLst>
   </p:cSld>
@@ -4069,216 +4099,6 @@
       </p:grpSpPr>
       <p:sp>
         <p:nvSpPr>
-          <p:cNvPr id="12" name="Título 11"/>
-          <p:cNvSpPr>
-            <a:spLocks noGrp="1"/>
-          </p:cNvSpPr>
-          <p:nvPr>
-            <p:ph type="title"/>
-          </p:nvPr>
-        </p:nvSpPr>
-        <p:spPr/>
-        <p:txBody>
-          <a:bodyPr/>
-          <a:lstStyle/>
-          <a:p>
-            <a:r>
-              <a:rPr lang="pt-BR" dirty="0"/>
-              <a:t>Estórias do Próximo Sprint</a:t>
-            </a:r>
-          </a:p>
-        </p:txBody>
-      </p:sp>
-      <p:sp>
-        <p:nvSpPr>
-          <p:cNvPr id="13" name="Espaço Reservado para Texto 12"/>
-          <p:cNvSpPr>
-            <a:spLocks noGrp="1"/>
-          </p:cNvSpPr>
-          <p:nvPr>
-            <p:ph type="body" idx="1"/>
-          </p:nvPr>
-        </p:nvSpPr>
-        <p:spPr/>
-        <p:txBody>
-          <a:bodyPr/>
-          <a:lstStyle/>
-          <a:p>
-            <a:endParaRPr lang="pt-BR" dirty="0"/>
-          </a:p>
-        </p:txBody>
-      </p:sp>
-    </p:spTree>
-    <p:extLst>
-      <p:ext uri="{BB962C8B-B14F-4D97-AF65-F5344CB8AC3E}">
-        <p14:creationId xmlns:p14="http://schemas.microsoft.com/office/powerpoint/2010/main" val="503902318"/>
-      </p:ext>
-    </p:extLst>
-  </p:cSld>
-  <p:clrMapOvr>
-    <a:masterClrMapping/>
-  </p:clrMapOvr>
-  <mc:AlternateContent xmlns:mc="http://schemas.openxmlformats.org/markup-compatibility/2006" xmlns:p14="http://schemas.microsoft.com/office/powerpoint/2010/main">
-    <mc:Choice Requires="p14">
-      <p:transition spd="slow" p14:dur="1300">
-        <p14:pan dir="u"/>
-      </p:transition>
-    </mc:Choice>
-    <mc:Fallback xmlns="">
-      <p:transition spd="slow">
-        <p:fade/>
-      </p:transition>
-    </mc:Fallback>
-  </mc:AlternateContent>
-</p:sld>
-</file>
-
-<file path=ppt/slides/slide8.xml><?xml version="1.0" encoding="utf-8"?>
-<p:sld xmlns:a="http://schemas.openxmlformats.org/drawingml/2006/main" xmlns:r="http://schemas.openxmlformats.org/officeDocument/2006/relationships" xmlns:p="http://schemas.openxmlformats.org/presentationml/2006/main">
-  <p:cSld>
-    <p:spTree>
-      <p:nvGrpSpPr>
-        <p:cNvPr id="1" name=""/>
-        <p:cNvGrpSpPr/>
-        <p:nvPr/>
-      </p:nvGrpSpPr>
-      <p:grpSpPr>
-        <a:xfrm>
-          <a:off x="0" y="0"/>
-          <a:ext cx="0" cy="0"/>
-          <a:chOff x="0" y="0"/>
-          <a:chExt cx="0" cy="0"/>
-        </a:xfrm>
-      </p:grpSpPr>
-      <p:sp>
-        <p:nvSpPr>
-          <p:cNvPr id="2" name="Título 1"/>
-          <p:cNvSpPr>
-            <a:spLocks noGrp="1"/>
-          </p:cNvSpPr>
-          <p:nvPr>
-            <p:ph type="title"/>
-          </p:nvPr>
-        </p:nvSpPr>
-        <p:spPr/>
-        <p:txBody>
-          <a:bodyPr/>
-          <a:lstStyle/>
-          <a:p>
-            <a:r>
-              <a:rPr lang="pt-BR" dirty="0"/>
-              <a:t>1ª Estória</a:t>
-            </a:r>
-          </a:p>
-        </p:txBody>
-      </p:sp>
-      <p:sp>
-        <p:nvSpPr>
-          <p:cNvPr id="3" name="Espaço Reservado para Conteúdo 2"/>
-          <p:cNvSpPr>
-            <a:spLocks noGrp="1"/>
-          </p:cNvSpPr>
-          <p:nvPr>
-            <p:ph idx="1"/>
-          </p:nvPr>
-        </p:nvSpPr>
-        <p:spPr>
-          <a:xfrm>
-            <a:off x="3869268" y="864108"/>
-            <a:ext cx="7490710" cy="5120640"/>
-          </a:xfrm>
-        </p:spPr>
-        <p:txBody>
-          <a:bodyPr/>
-          <a:lstStyle/>
-          <a:p>
-            <a:pPr algn="just"/>
-            <a:r>
-              <a:rPr lang="pt-BR" b="1" dirty="0"/>
-              <a:t>1ª Estória: </a:t>
-            </a:r>
-            <a:r>
-              <a:rPr lang="pt-BR" dirty="0"/>
-              <a:t>Implementação das superclasses.</a:t>
-            </a:r>
-            <a:endParaRPr lang="pt-BR" sz="1400" dirty="0">
-              <a:latin typeface="Calibri" panose="020F0502020204030204" pitchFamily="34" charset="0"/>
-              <a:ea typeface="Calibri" panose="020F0502020204030204" pitchFamily="34" charset="0"/>
-              <a:cs typeface="Times New Roman" panose="02020603050405020304" pitchFamily="18" charset="0"/>
-            </a:endParaRPr>
-          </a:p>
-          <a:p>
-            <a:pPr algn="just"/>
-            <a:r>
-              <a:rPr lang="pt-BR" b="1" dirty="0"/>
-              <a:t>Descrição</a:t>
-            </a:r>
-            <a:r>
-              <a:rPr lang="pt-BR" dirty="0"/>
-              <a:t>: Iniciar a implementação/codificação da superclasse principal do projeto.</a:t>
-            </a:r>
-          </a:p>
-          <a:p>
-            <a:r>
-              <a:rPr lang="pt-BR" b="1" dirty="0"/>
-              <a:t>Status: </a:t>
-            </a:r>
-            <a:r>
-              <a:rPr lang="pt-BR" dirty="0"/>
-              <a:t>[Não iniciado].</a:t>
-            </a:r>
-            <a:endParaRPr lang="pt-BR" dirty="0">
-              <a:latin typeface="Calibri" panose="020F0502020204030204" pitchFamily="34" charset="0"/>
-              <a:ea typeface="Calibri" panose="020F0502020204030204" pitchFamily="34" charset="0"/>
-              <a:cs typeface="Times New Roman" panose="02020603050405020304" pitchFamily="18" charset="0"/>
-            </a:endParaRPr>
-          </a:p>
-        </p:txBody>
-      </p:sp>
-    </p:spTree>
-    <p:extLst>
-      <p:ext uri="{BB962C8B-B14F-4D97-AF65-F5344CB8AC3E}">
-        <p14:creationId xmlns:p14="http://schemas.microsoft.com/office/powerpoint/2010/main" val="398285591"/>
-      </p:ext>
-    </p:extLst>
-  </p:cSld>
-  <p:clrMapOvr>
-    <a:masterClrMapping/>
-  </p:clrMapOvr>
-  <mc:AlternateContent xmlns:mc="http://schemas.openxmlformats.org/markup-compatibility/2006" xmlns:p14="http://schemas.microsoft.com/office/powerpoint/2010/main">
-    <mc:Choice Requires="p14">
-      <p:transition spd="slow" p14:dur="1300">
-        <p14:pan dir="u"/>
-      </p:transition>
-    </mc:Choice>
-    <mc:Fallback xmlns="">
-      <p:transition spd="slow">
-        <p:fade/>
-      </p:transition>
-    </mc:Fallback>
-  </mc:AlternateContent>
-</p:sld>
-</file>
-
-<file path=ppt/slides/slide9.xml><?xml version="1.0" encoding="utf-8"?>
-<p:sld xmlns:a="http://schemas.openxmlformats.org/drawingml/2006/main" xmlns:r="http://schemas.openxmlformats.org/officeDocument/2006/relationships" xmlns:p="http://schemas.openxmlformats.org/presentationml/2006/main">
-  <p:cSld>
-    <p:spTree>
-      <p:nvGrpSpPr>
-        <p:cNvPr id="1" name=""/>
-        <p:cNvGrpSpPr/>
-        <p:nvPr/>
-      </p:nvGrpSpPr>
-      <p:grpSpPr>
-        <a:xfrm>
-          <a:off x="0" y="0"/>
-          <a:ext cx="0" cy="0"/>
-          <a:chOff x="0" y="0"/>
-          <a:chExt cx="0" cy="0"/>
-        </a:xfrm>
-      </p:grpSpPr>
-      <p:sp>
-        <p:nvSpPr>
           <p:cNvPr id="2" name="Título 1">
             <a:extLst>
               <a:ext uri="{FF2B5EF4-FFF2-40B4-BE49-F238E27FC236}">
@@ -4299,8 +4119,8 @@
           <a:lstStyle/>
           <a:p>
             <a:r>
-              <a:rPr lang="pt-BR"/>
-              <a:t>2ª Estória </a:t>
+              <a:rPr lang="pt-BR" dirty="0"/>
+              <a:t>1ª Estória </a:t>
             </a:r>
           </a:p>
         </p:txBody>
@@ -4327,32 +4147,32 @@
           <a:lstStyle/>
           <a:p>
             <a:r>
-              <a:rPr lang="pt-BR" b="1"/>
-              <a:t>2ª Estória</a:t>
-            </a:r>
-            <a:r>
-              <a:rPr lang="pt-BR"/>
-              <a:t>: Aprimorar Software </a:t>
-            </a:r>
-          </a:p>
-          <a:p>
-            <a:r>
-              <a:rPr lang="pt-BR" b="1"/>
+              <a:rPr lang="pt-BR" b="1" dirty="0"/>
+              <a:t>1ª Estória</a:t>
+            </a:r>
+            <a:r>
+              <a:rPr lang="pt-BR" dirty="0"/>
+              <a:t>: Ligar a interface ao software.</a:t>
+            </a:r>
+          </a:p>
+          <a:p>
+            <a:r>
+              <a:rPr lang="pt-BR" b="1" dirty="0"/>
               <a:t>Descrição</a:t>
             </a:r>
             <a:r>
-              <a:rPr lang="pt-BR"/>
-              <a:t>: Corrigir possível falhas no software e na base das falhas procurar melhorar o software. </a:t>
-            </a:r>
-          </a:p>
-          <a:p>
-            <a:r>
-              <a:rPr lang="pt-BR" b="1"/>
+              <a:rPr lang="pt-BR" dirty="0"/>
+              <a:t>: Após a codificação e juntar com a interface para o primeiro protótipo do software. </a:t>
+            </a:r>
+          </a:p>
+          <a:p>
+            <a:r>
+              <a:rPr lang="pt-BR" b="1" dirty="0"/>
               <a:t>Status</a:t>
             </a:r>
             <a:r>
-              <a:rPr lang="pt-BR"/>
-              <a:t>: [Não concluído].</a:t>
+              <a:rPr lang="pt-BR" dirty="0"/>
+              <a:t>: [Em andamento].</a:t>
             </a:r>
           </a:p>
         </p:txBody>
@@ -4360,7 +4180,7 @@
     </p:spTree>
     <p:extLst>
       <p:ext uri="{BB962C8B-B14F-4D97-AF65-F5344CB8AC3E}">
-        <p14:creationId xmlns:p14="http://schemas.microsoft.com/office/powerpoint/2010/main" val="1391589051"/>
+        <p14:creationId xmlns:p14="http://schemas.microsoft.com/office/powerpoint/2010/main" val="325827969"/>
       </p:ext>
     </p:extLst>
   </p:cSld>

</xml_diff>

<commit_message>
Realizando alguns pequenos consertos no Slide
</commit_message>
<xml_diff>
--- a/Sprints/Sprint_003 da equipe.pptx
+++ b/Sprints/Sprint_003 da equipe.pptx
@@ -3716,7 +3716,7 @@
             </a:r>
             <a:r>
               <a:rPr lang="pt-BR" dirty="0"/>
-              <a:t>: Iniciar a implementação/codificação da superclasse principal do projeto.</a:t>
+              <a:t>: Iniciada a implementação/codificação da superclasse principal do projeto.</a:t>
             </a:r>
           </a:p>
           <a:p>
@@ -3843,7 +3843,7 @@
             </a:r>
             <a:r>
               <a:rPr lang="pt-BR" dirty="0"/>
-              <a:t>: Verificando as classes e seus atributos para ter certeza se tudo é necessário ou não. </a:t>
+              <a:t>: Verificando as classes e seus atributos para ter certeza se tudo é necessário ou não. E se os métodos do diagrama de classes serão suficientes para o software.</a:t>
             </a:r>
           </a:p>
           <a:p>
@@ -4172,7 +4172,7 @@
             </a:r>
             <a:r>
               <a:rPr lang="pt-BR" dirty="0"/>
-              <a:t>: [Em andamento].</a:t>
+              <a:t>: [Não iniciado].</a:t>
             </a:r>
           </a:p>
         </p:txBody>

</xml_diff>